<commit_message>
Fix knit issue and update fig 1 numbers
</commit_message>
<xml_diff>
--- a/manuscript/img/study_design.pptx
+++ b/manuscript/img/study_design.pptx
@@ -600,6 +600,7 @@
     </c:plotArea>
     <c:plotVisOnly val="1"/>
     <c:dispBlanksAs val="gap"/>
+    <c:showDLblsOverMax val="0"/>
     <c:extLst>
       <c:ext xmlns:c16r3="http://schemas.microsoft.com/office/drawing/2017/03/chart" uri="{56B9EC1D-385E-4148-901F-78D8002777C0}">
         <c16r3:dataDisplayOptions16>
@@ -607,7 +608,6 @@
         </c16r3:dataDisplayOptions16>
       </c:ext>
     </c:extLst>
-    <c:showDLblsOverMax val="0"/>
   </c:chart>
   <c:spPr>
     <a:solidFill>
@@ -1102,6 +1102,7 @@
     </c:plotArea>
     <c:plotVisOnly val="1"/>
     <c:dispBlanksAs val="gap"/>
+    <c:showDLblsOverMax val="0"/>
     <c:extLst>
       <c:ext xmlns:c16r3="http://schemas.microsoft.com/office/drawing/2017/03/chart" uri="{56B9EC1D-385E-4148-901F-78D8002777C0}">
         <c16r3:dataDisplayOptions16>
@@ -1109,7 +1110,6 @@
         </c16r3:dataDisplayOptions16>
       </c:ext>
     </c:extLst>
-    <c:showDLblsOverMax val="0"/>
   </c:chart>
   <c:spPr>
     <a:solidFill>
@@ -1619,6 +1619,7 @@
     </c:plotArea>
     <c:plotVisOnly val="1"/>
     <c:dispBlanksAs val="gap"/>
+    <c:showDLblsOverMax val="0"/>
     <c:extLst>
       <c:ext xmlns:c16r3="http://schemas.microsoft.com/office/drawing/2017/03/chart" uri="{56B9EC1D-385E-4148-901F-78D8002777C0}">
         <c16r3:dataDisplayOptions16>
@@ -1626,7 +1627,6 @@
         </c16r3:dataDisplayOptions16>
       </c:ext>
     </c:extLst>
-    <c:showDLblsOverMax val="0"/>
   </c:chart>
   <c:spPr>
     <a:solidFill>
@@ -6789,7 +6789,7 @@
           <a:p>
             <a:fld id="{E4E38EDD-3C76-B444-AFF1-88DDA1DA1047}" type="datetimeFigureOut">
               <a:rPr lang="en-GB" smtClean="0"/>
-              <a:t>15/07/2025</a:t>
+              <a:t>13/08/2025</a:t>
             </a:fld>
             <a:endParaRPr lang="en-GB"/>
           </a:p>
@@ -7382,7 +7382,7 @@
           <a:p>
             <a:fld id="{32004B65-F988-A147-B5C6-3EAC0846CAA1}" type="datetimeFigureOut">
               <a:rPr lang="en-GB" smtClean="0"/>
-              <a:t>15/07/2025</a:t>
+              <a:t>13/08/2025</a:t>
             </a:fld>
             <a:endParaRPr lang="en-GB"/>
           </a:p>
@@ -7552,7 +7552,7 @@
           <a:p>
             <a:fld id="{32004B65-F988-A147-B5C6-3EAC0846CAA1}" type="datetimeFigureOut">
               <a:rPr lang="en-GB" smtClean="0"/>
-              <a:t>15/07/2025</a:t>
+              <a:t>13/08/2025</a:t>
             </a:fld>
             <a:endParaRPr lang="en-GB"/>
           </a:p>
@@ -7732,7 +7732,7 @@
           <a:p>
             <a:fld id="{32004B65-F988-A147-B5C6-3EAC0846CAA1}" type="datetimeFigureOut">
               <a:rPr lang="en-GB" smtClean="0"/>
-              <a:t>15/07/2025</a:t>
+              <a:t>13/08/2025</a:t>
             </a:fld>
             <a:endParaRPr lang="en-GB"/>
           </a:p>
@@ -7902,7 +7902,7 @@
           <a:p>
             <a:fld id="{32004B65-F988-A147-B5C6-3EAC0846CAA1}" type="datetimeFigureOut">
               <a:rPr lang="en-GB" smtClean="0"/>
-              <a:t>15/07/2025</a:t>
+              <a:t>13/08/2025</a:t>
             </a:fld>
             <a:endParaRPr lang="en-GB"/>
           </a:p>
@@ -8148,7 +8148,7 @@
           <a:p>
             <a:fld id="{32004B65-F988-A147-B5C6-3EAC0846CAA1}" type="datetimeFigureOut">
               <a:rPr lang="en-GB" smtClean="0"/>
-              <a:t>15/07/2025</a:t>
+              <a:t>13/08/2025</a:t>
             </a:fld>
             <a:endParaRPr lang="en-GB"/>
           </a:p>
@@ -8380,7 +8380,7 @@
           <a:p>
             <a:fld id="{32004B65-F988-A147-B5C6-3EAC0846CAA1}" type="datetimeFigureOut">
               <a:rPr lang="en-GB" smtClean="0"/>
-              <a:t>15/07/2025</a:t>
+              <a:t>13/08/2025</a:t>
             </a:fld>
             <a:endParaRPr lang="en-GB"/>
           </a:p>
@@ -8747,7 +8747,7 @@
           <a:p>
             <a:fld id="{32004B65-F988-A147-B5C6-3EAC0846CAA1}" type="datetimeFigureOut">
               <a:rPr lang="en-GB" smtClean="0"/>
-              <a:t>15/07/2025</a:t>
+              <a:t>13/08/2025</a:t>
             </a:fld>
             <a:endParaRPr lang="en-GB"/>
           </a:p>
@@ -8865,7 +8865,7 @@
           <a:p>
             <a:fld id="{32004B65-F988-A147-B5C6-3EAC0846CAA1}" type="datetimeFigureOut">
               <a:rPr lang="en-GB" smtClean="0"/>
-              <a:t>15/07/2025</a:t>
+              <a:t>13/08/2025</a:t>
             </a:fld>
             <a:endParaRPr lang="en-GB"/>
           </a:p>
@@ -8960,7 +8960,7 @@
           <a:p>
             <a:fld id="{32004B65-F988-A147-B5C6-3EAC0846CAA1}" type="datetimeFigureOut">
               <a:rPr lang="en-GB" smtClean="0"/>
-              <a:t>15/07/2025</a:t>
+              <a:t>13/08/2025</a:t>
             </a:fld>
             <a:endParaRPr lang="en-GB"/>
           </a:p>
@@ -9237,7 +9237,7 @@
           <a:p>
             <a:fld id="{32004B65-F988-A147-B5C6-3EAC0846CAA1}" type="datetimeFigureOut">
               <a:rPr lang="en-GB" smtClean="0"/>
-              <a:t>15/07/2025</a:t>
+              <a:t>13/08/2025</a:t>
             </a:fld>
             <a:endParaRPr lang="en-GB"/>
           </a:p>
@@ -9494,7 +9494,7 @@
           <a:p>
             <a:fld id="{32004B65-F988-A147-B5C6-3EAC0846CAA1}" type="datetimeFigureOut">
               <a:rPr lang="en-GB" smtClean="0"/>
-              <a:t>15/07/2025</a:t>
+              <a:t>13/08/2025</a:t>
             </a:fld>
             <a:endParaRPr lang="en-GB"/>
           </a:p>
@@ -9707,7 +9707,7 @@
           <a:p>
             <a:fld id="{32004B65-F988-A147-B5C6-3EAC0846CAA1}" type="datetimeFigureOut">
               <a:rPr lang="en-GB" smtClean="0"/>
-              <a:t>15/07/2025</a:t>
+              <a:t>13/08/2025</a:t>
             </a:fld>
             <a:endParaRPr lang="en-GB"/>
           </a:p>
@@ -11373,7 +11373,7 @@
           <p:nvPr>
             <p:extLst>
               <p:ext uri="{D42A27DB-BD31-4B8C-83A1-F6EECF244321}">
-                <p14:modId xmlns:p14="http://schemas.microsoft.com/office/powerpoint/2010/main" val="3339245625"/>
+                <p14:modId xmlns:p14="http://schemas.microsoft.com/office/powerpoint/2010/main" val="3870636375"/>
               </p:ext>
             </p:extLst>
           </p:nvPr>
@@ -11752,7 +11752,7 @@
                             </a:schemeClr>
                           </a:solidFill>
                         </a:rPr>
-                        <a:t>0.25</a:t>
+                        <a:t>0.02</a:t>
                       </a:r>
                     </a:p>
                   </a:txBody>
@@ -11771,7 +11771,7 @@
                             </a:schemeClr>
                           </a:solidFill>
                         </a:rPr>
-                        <a:t>0.60</a:t>
+                        <a:t>0.90</a:t>
                       </a:r>
                     </a:p>
                   </a:txBody>
@@ -11917,7 +11917,7 @@
           <p:nvPr>
             <p:extLst>
               <p:ext uri="{D42A27DB-BD31-4B8C-83A1-F6EECF244321}">
-                <p14:modId xmlns:p14="http://schemas.microsoft.com/office/powerpoint/2010/main" val="3717833126"/>
+                <p14:modId xmlns:p14="http://schemas.microsoft.com/office/powerpoint/2010/main" val="3905348110"/>
               </p:ext>
             </p:extLst>
           </p:nvPr>
@@ -12461,7 +12461,7 @@
           <p:nvPr>
             <p:extLst>
               <p:ext uri="{D42A27DB-BD31-4B8C-83A1-F6EECF244321}">
-                <p14:modId xmlns:p14="http://schemas.microsoft.com/office/powerpoint/2010/main" val="1221877660"/>
+                <p14:modId xmlns:p14="http://schemas.microsoft.com/office/powerpoint/2010/main" val="2251895125"/>
               </p:ext>
             </p:extLst>
           </p:nvPr>
@@ -15206,7 +15206,7 @@
           <p:nvPr>
             <p:extLst>
               <p:ext uri="{D42A27DB-BD31-4B8C-83A1-F6EECF244321}">
-                <p14:modId xmlns:p14="http://schemas.microsoft.com/office/powerpoint/2010/main" val="462632121"/>
+                <p14:modId xmlns:p14="http://schemas.microsoft.com/office/powerpoint/2010/main" val="1756802799"/>
               </p:ext>
             </p:extLst>
           </p:nvPr>
@@ -19548,14 +19548,14 @@
           <p:nvPr>
             <p:extLst>
               <p:ext uri="{D42A27DB-BD31-4B8C-83A1-F6EECF244321}">
-                <p14:modId xmlns:p14="http://schemas.microsoft.com/office/powerpoint/2010/main" val="1075576443"/>
+                <p14:modId xmlns:p14="http://schemas.microsoft.com/office/powerpoint/2010/main" val="4241131326"/>
               </p:ext>
             </p:extLst>
           </p:nvPr>
         </p:nvGraphicFramePr>
         <p:xfrm>
           <a:off x="6479076" y="2098527"/>
-          <a:ext cx="3452058" cy="1280160"/>
+          <a:ext cx="4133189" cy="1417320"/>
         </p:xfrm>
         <a:graphic>
           <a:graphicData uri="http://schemas.openxmlformats.org/drawingml/2006/table">
@@ -19564,42 +19564,56 @@
                 <a:tableStyleId>{00A15C55-8517-42AA-B614-E9B94910E393}</a:tableStyleId>
               </a:tblPr>
               <a:tblGrid>
-                <a:gridCol w="635519">
+                <a:gridCol w="570397">
                   <a:extLst>
                     <a:ext uri="{9D8B030D-6E8A-4147-A177-3AD203B41FA5}">
                       <a16:colId xmlns:a16="http://schemas.microsoft.com/office/drawing/2014/main" val="1666150210"/>
                     </a:ext>
                   </a:extLst>
                 </a:gridCol>
-                <a:gridCol w="518596">
+                <a:gridCol w="465454">
                   <a:extLst>
                     <a:ext uri="{9D8B030D-6E8A-4147-A177-3AD203B41FA5}">
                       <a16:colId xmlns:a16="http://schemas.microsoft.com/office/drawing/2014/main" val="645246616"/>
                     </a:ext>
                   </a:extLst>
                 </a:gridCol>
-                <a:gridCol w="518596">
+                <a:gridCol w="465454">
                   <a:extLst>
                     <a:ext uri="{9D8B030D-6E8A-4147-A177-3AD203B41FA5}">
                       <a16:colId xmlns:a16="http://schemas.microsoft.com/office/drawing/2014/main" val="357973742"/>
                     </a:ext>
                   </a:extLst>
                 </a:gridCol>
-                <a:gridCol w="518596">
+                <a:gridCol w="465454">
                   <a:extLst>
                     <a:ext uri="{9D8B030D-6E8A-4147-A177-3AD203B41FA5}">
                       <a16:colId xmlns:a16="http://schemas.microsoft.com/office/drawing/2014/main" val="1702401980"/>
                     </a:ext>
                   </a:extLst>
                 </a:gridCol>
-                <a:gridCol w="511717">
+                <a:gridCol w="493709">
                   <a:extLst>
                     <a:ext uri="{9D8B030D-6E8A-4147-A177-3AD203B41FA5}">
                       <a16:colId xmlns:a16="http://schemas.microsoft.com/office/drawing/2014/main" val="3092555947"/>
                     </a:ext>
                   </a:extLst>
                 </a:gridCol>
-                <a:gridCol w="749034">
+                <a:gridCol w="233159">
+                  <a:extLst>
+                    <a:ext uri="{9D8B030D-6E8A-4147-A177-3AD203B41FA5}">
+                      <a16:colId xmlns:a16="http://schemas.microsoft.com/office/drawing/2014/main" val="2327679021"/>
+                    </a:ext>
+                  </a:extLst>
+                </a:gridCol>
+                <a:gridCol w="680912">
+                  <a:extLst>
+                    <a:ext uri="{9D8B030D-6E8A-4147-A177-3AD203B41FA5}">
+                      <a16:colId xmlns:a16="http://schemas.microsoft.com/office/drawing/2014/main" val="1118095746"/>
+                    </a:ext>
+                  </a:extLst>
+                </a:gridCol>
+                <a:gridCol w="758650">
                   <a:extLst>
                     <a:ext uri="{9D8B030D-6E8A-4147-A177-3AD203B41FA5}">
                       <a16:colId xmlns:a16="http://schemas.microsoft.com/office/drawing/2014/main" val="1138272950"/>
@@ -19642,7 +19656,7 @@
                       </a:pPr>
                       <a:r>
                         <a:rPr lang="en-GB" sz="900" dirty="0"/>
-                        <a:t>Cell 1</a:t>
+                        <a:t>Cell Z1</a:t>
                       </a:r>
                     </a:p>
                     <a:p>
@@ -19658,7 +19672,7 @@
                     <a:p>
                       <a:r>
                         <a:rPr lang="en-GB" sz="900" dirty="0"/>
-                        <a:t>Cell 2</a:t>
+                        <a:t>Cell Z2</a:t>
                       </a:r>
                     </a:p>
                   </a:txBody>
@@ -19671,7 +19685,7 @@
                     <a:p>
                       <a:r>
                         <a:rPr lang="en-GB" sz="900" dirty="0"/>
-                        <a:t>Cell 3</a:t>
+                        <a:t>Cell Z3</a:t>
                       </a:r>
                     </a:p>
                   </a:txBody>
@@ -19751,13 +19765,16 @@
                     <a:bodyPr/>
                     <a:lstStyle/>
                     <a:p>
+                      <a:pPr algn="ctr"/>
                       <a:r>
                         <a:rPr lang="en-GB" sz="900" dirty="0">
                           <a:solidFill>
-                            <a:schemeClr val="bg1"/>
+                            <a:schemeClr val="tx1">
+                              <a:lumMod val="50000"/>
+                            </a:schemeClr>
                           </a:solidFill>
                         </a:rPr>
-                        <a:t>Specificity</a:t>
+                        <a:t>…</a:t>
                       </a:r>
                     </a:p>
                   </a:txBody>
@@ -19803,6 +19820,146 @@
                     </a:solidFill>
                   </a:tcPr>
                 </a:tc>
+                <a:tc>
+                  <a:txBody>
+                    <a:bodyPr/>
+                    <a:lstStyle/>
+                    <a:p>
+                      <a:r>
+                        <a:rPr lang="en-GB" sz="900" dirty="0">
+                          <a:solidFill>
+                            <a:schemeClr val="tx1">
+                              <a:lumMod val="50000"/>
+                            </a:schemeClr>
+                          </a:solidFill>
+                        </a:rPr>
+                        <a:t>Sum</a:t>
+                      </a:r>
+                    </a:p>
+                    <a:p>
+                      <a:r>
+                        <a:rPr lang="en-GB" sz="700" b="0" i="1" dirty="0">
+                          <a:solidFill>
+                            <a:schemeClr val="tx1">
+                              <a:lumMod val="50000"/>
+                            </a:schemeClr>
+                          </a:solidFill>
+                        </a:rPr>
+                        <a:t>(all </a:t>
+                      </a:r>
+                    </a:p>
+                    <a:p>
+                      <a:r>
+                        <a:rPr lang="en-GB" sz="700" b="0" i="1" dirty="0">
+                          <a:solidFill>
+                            <a:schemeClr val="tx1">
+                              <a:lumMod val="50000"/>
+                            </a:schemeClr>
+                          </a:solidFill>
+                        </a:rPr>
+                        <a:t>cell types)</a:t>
+                      </a:r>
+                    </a:p>
+                  </a:txBody>
+                  <a:tcPr>
+                    <a:lnL w="12700" cap="flat" cmpd="sng" algn="ctr">
+                      <a:solidFill>
+                        <a:schemeClr val="accent4"/>
+                      </a:solidFill>
+                      <a:prstDash val="solid"/>
+                      <a:round/>
+                      <a:headEnd type="none" w="med" len="med"/>
+                      <a:tailEnd type="none" w="med" len="med"/>
+                    </a:lnL>
+                    <a:lnR w="12700" cap="flat" cmpd="sng" algn="ctr">
+                      <a:solidFill>
+                        <a:schemeClr val="accent4"/>
+                      </a:solidFill>
+                      <a:prstDash val="solid"/>
+                      <a:round/>
+                      <a:headEnd type="none" w="med" len="med"/>
+                      <a:tailEnd type="none" w="med" len="med"/>
+                    </a:lnR>
+                    <a:lnT w="12700" cap="flat" cmpd="sng" algn="ctr">
+                      <a:solidFill>
+                        <a:schemeClr val="accent4"/>
+                      </a:solidFill>
+                      <a:prstDash val="solid"/>
+                      <a:round/>
+                      <a:headEnd type="none" w="med" len="med"/>
+                      <a:tailEnd type="none" w="med" len="med"/>
+                    </a:lnT>
+                    <a:lnB w="12700" cap="flat" cmpd="sng" algn="ctr">
+                      <a:solidFill>
+                        <a:schemeClr val="accent4"/>
+                      </a:solidFill>
+                      <a:prstDash val="solid"/>
+                      <a:round/>
+                      <a:headEnd type="none" w="med" len="med"/>
+                      <a:tailEnd type="none" w="med" len="med"/>
+                    </a:lnB>
+                    <a:solidFill>
+                      <a:schemeClr val="tx1"/>
+                    </a:solidFill>
+                  </a:tcPr>
+                </a:tc>
+                <a:tc>
+                  <a:txBody>
+                    <a:bodyPr/>
+                    <a:lstStyle/>
+                    <a:p>
+                      <a:r>
+                        <a:rPr lang="en-GB" sz="900" dirty="0">
+                          <a:solidFill>
+                            <a:schemeClr val="bg1"/>
+                          </a:solidFill>
+                        </a:rPr>
+                        <a:t>Specificity</a:t>
+                      </a:r>
+                    </a:p>
+                  </a:txBody>
+                  <a:tcPr>
+                    <a:lnL w="12700" cap="flat" cmpd="sng" algn="ctr">
+                      <a:solidFill>
+                        <a:schemeClr val="accent4"/>
+                      </a:solidFill>
+                      <a:prstDash val="solid"/>
+                      <a:round/>
+                      <a:headEnd type="none" w="med" len="med"/>
+                      <a:tailEnd type="none" w="med" len="med"/>
+                    </a:lnL>
+                    <a:lnR w="12700" cap="flat" cmpd="sng" algn="ctr">
+                      <a:solidFill>
+                        <a:schemeClr val="accent4"/>
+                      </a:solidFill>
+                      <a:prstDash val="solid"/>
+                      <a:round/>
+                      <a:headEnd type="none" w="med" len="med"/>
+                      <a:tailEnd type="none" w="med" len="med"/>
+                    </a:lnR>
+                    <a:lnT w="12700" cap="flat" cmpd="sng" algn="ctr">
+                      <a:solidFill>
+                        <a:schemeClr val="accent4"/>
+                      </a:solidFill>
+                      <a:prstDash val="solid"/>
+                      <a:round/>
+                      <a:headEnd type="none" w="med" len="med"/>
+                      <a:tailEnd type="none" w="med" len="med"/>
+                    </a:lnT>
+                    <a:lnB w="12700" cap="flat" cmpd="sng" algn="ctr">
+                      <a:solidFill>
+                        <a:schemeClr val="accent4"/>
+                      </a:solidFill>
+                      <a:prstDash val="solid"/>
+                      <a:round/>
+                      <a:headEnd type="none" w="med" len="med"/>
+                      <a:tailEnd type="none" w="med" len="med"/>
+                    </a:lnB>
+                    <a:solidFill>
+                      <a:schemeClr val="tx1"/>
+                    </a:solidFill>
+                  </a:tcPr>
+                </a:tc>
                 <a:extLst>
                   <a:ext uri="{0D108BD9-81ED-4DB2-BD59-A6C34878D82A}">
                     <a16:rowId xmlns:a16="http://schemas.microsoft.com/office/drawing/2014/main" val="1761758748"/>
@@ -19929,13 +20086,32 @@
                     <a:bodyPr/>
                     <a:lstStyle/>
                     <a:p>
-                      <a:r>
-                        <a:rPr lang="en-GB" sz="900" b="0" dirty="0">
+                      <a:pPr marL="0" marR="0" lvl="0" indent="0" algn="l" defTabSz="1219170" rtl="0" eaLnBrk="1" fontAlgn="auto" latinLnBrk="0" hangingPunct="1">
+                        <a:lnSpc>
+                          <a:spcPct val="100000"/>
+                        </a:lnSpc>
+                        <a:spcBef>
+                          <a:spcPts val="0"/>
+                        </a:spcBef>
+                        <a:spcAft>
+                          <a:spcPts val="0"/>
+                        </a:spcAft>
+                        <a:buClrTx/>
+                        <a:buSzTx/>
+                        <a:buFontTx/>
+                        <a:buNone/>
+                        <a:tabLst/>
+                        <a:defRPr/>
+                      </a:pPr>
+                      <a:r>
+                        <a:rPr lang="en-GB" sz="900" dirty="0">
                           <a:solidFill>
-                            <a:schemeClr val="bg1"/>
+                            <a:schemeClr val="tx1">
+                              <a:lumMod val="50000"/>
+                            </a:schemeClr>
                           </a:solidFill>
                         </a:rPr>
-                        <a:t>0</a:t>
+                        <a:t>…</a:t>
                       </a:r>
                     </a:p>
                   </a:txBody>
@@ -19954,6 +20130,68 @@
                     </a:solidFill>
                   </a:tcPr>
                 </a:tc>
+                <a:tc>
+                  <a:txBody>
+                    <a:bodyPr/>
+                    <a:lstStyle/>
+                    <a:p>
+                      <a:r>
+                        <a:rPr lang="en-GB" sz="900" b="0" dirty="0">
+                          <a:solidFill>
+                            <a:schemeClr val="tx1">
+                              <a:lumMod val="50000"/>
+                            </a:schemeClr>
+                          </a:solidFill>
+                        </a:rPr>
+                        <a:t> / 5</a:t>
+                      </a:r>
+                    </a:p>
+                  </a:txBody>
+                  <a:tcPr>
+                    <a:lnT w="12700" cap="flat" cmpd="sng" algn="ctr">
+                      <a:solidFill>
+                        <a:schemeClr val="accent4"/>
+                      </a:solidFill>
+                      <a:prstDash val="solid"/>
+                      <a:round/>
+                      <a:headEnd type="none" w="med" len="med"/>
+                      <a:tailEnd type="none" w="med" len="med"/>
+                    </a:lnT>
+                    <a:solidFill>
+                      <a:schemeClr val="tx1"/>
+                    </a:solidFill>
+                  </a:tcPr>
+                </a:tc>
+                <a:tc>
+                  <a:txBody>
+                    <a:bodyPr/>
+                    <a:lstStyle/>
+                    <a:p>
+                      <a:r>
+                        <a:rPr lang="en-GB" sz="900" b="0" dirty="0">
+                          <a:solidFill>
+                            <a:schemeClr val="bg1"/>
+                          </a:solidFill>
+                        </a:rPr>
+                        <a:t>= 0</a:t>
+                      </a:r>
+                    </a:p>
+                  </a:txBody>
+                  <a:tcPr>
+                    <a:lnT w="12700" cap="flat" cmpd="sng" algn="ctr">
+                      <a:solidFill>
+                        <a:schemeClr val="accent4"/>
+                      </a:solidFill>
+                      <a:prstDash val="solid"/>
+                      <a:round/>
+                      <a:headEnd type="none" w="med" len="med"/>
+                      <a:tailEnd type="none" w="med" len="med"/>
+                    </a:lnT>
+                    <a:solidFill>
+                      <a:schemeClr val="tx1"/>
+                    </a:solidFill>
+                  </a:tcPr>
+                </a:tc>
                 <a:extLst>
                   <a:ext uri="{0D108BD9-81ED-4DB2-BD59-A6C34878D82A}">
                     <a16:rowId xmlns:a16="http://schemas.microsoft.com/office/drawing/2014/main" val="461565399"/>
@@ -20071,180 +20309,23 @@
                     <a:bodyPr/>
                     <a:lstStyle/>
                     <a:p>
-                      <a:r>
-                        <a:rPr lang="en-GB" sz="900" b="0" dirty="0">
-                          <a:solidFill>
-                            <a:schemeClr val="bg1"/>
-                          </a:solidFill>
-                        </a:rPr>
-                        <a:t>0.01</a:t>
-                      </a:r>
-                    </a:p>
-                  </a:txBody>
-                  <a:tcPr>
-                    <a:solidFill>
-                      <a:schemeClr val="tx1"/>
-                    </a:solidFill>
-                  </a:tcPr>
-                </a:tc>
-                <a:extLst>
-                  <a:ext uri="{0D108BD9-81ED-4DB2-BD59-A6C34878D82A}">
-                    <a16:rowId xmlns:a16="http://schemas.microsoft.com/office/drawing/2014/main" val="1278667350"/>
-                  </a:ext>
-                </a:extLst>
-              </a:tr>
-              <a:tr h="177507">
-                <a:tc>
-                  <a:txBody>
-                    <a:bodyPr/>
-                    <a:lstStyle/>
-                    <a:p>
-                      <a:r>
-                        <a:rPr lang="en-GB" sz="900" dirty="0"/>
-                        <a:t>Gene 3</a:t>
-                      </a:r>
-                    </a:p>
-                  </a:txBody>
-                  <a:tcPr/>
-                </a:tc>
-                <a:tc>
-                  <a:txBody>
-                    <a:bodyPr/>
-                    <a:lstStyle/>
-                    <a:p>
-                      <a:r>
-                        <a:rPr lang="en-GB" sz="900" dirty="0">
-                          <a:solidFill>
-                            <a:schemeClr val="tx1">
-                              <a:lumMod val="50000"/>
-                            </a:schemeClr>
-                          </a:solidFill>
-                        </a:rPr>
-                        <a:t>10</a:t>
-                      </a:r>
-                    </a:p>
-                  </a:txBody>
-                  <a:tcPr>
-                    <a:solidFill>
-                      <a:schemeClr val="tx1"/>
-                    </a:solidFill>
-                  </a:tcPr>
-                </a:tc>
-                <a:tc>
-                  <a:txBody>
-                    <a:bodyPr/>
-                    <a:lstStyle/>
-                    <a:p>
-                      <a:r>
-                        <a:rPr lang="en-GB" sz="900" dirty="0">
-                          <a:solidFill>
-                            <a:schemeClr val="tx1">
-                              <a:lumMod val="50000"/>
-                            </a:schemeClr>
-                          </a:solidFill>
-                        </a:rPr>
-                        <a:t>8</a:t>
-                      </a:r>
-                    </a:p>
-                  </a:txBody>
-                  <a:tcPr>
-                    <a:solidFill>
-                      <a:schemeClr val="tx1"/>
-                    </a:solidFill>
-                  </a:tcPr>
-                </a:tc>
-                <a:tc>
-                  <a:txBody>
-                    <a:bodyPr/>
-                    <a:lstStyle/>
-                    <a:p>
-                      <a:r>
-                        <a:rPr lang="en-GB" sz="900" dirty="0">
-                          <a:solidFill>
-                            <a:schemeClr val="tx1">
-                              <a:lumMod val="50000"/>
-                            </a:schemeClr>
-                          </a:solidFill>
-                        </a:rPr>
-                        <a:t>12</a:t>
-                      </a:r>
-                    </a:p>
-                  </a:txBody>
-                  <a:tcPr>
-                    <a:solidFill>
-                      <a:schemeClr val="tx1"/>
-                    </a:solidFill>
-                  </a:tcPr>
-                </a:tc>
-                <a:tc>
-                  <a:txBody>
-                    <a:bodyPr/>
-                    <a:lstStyle/>
-                    <a:p>
-                      <a:r>
-                        <a:rPr lang="en-GB" sz="900" b="0" dirty="0">
-                          <a:solidFill>
-                            <a:schemeClr val="tx1">
-                              <a:lumMod val="50000"/>
-                            </a:schemeClr>
-                          </a:solidFill>
-                        </a:rPr>
-                        <a:t>10</a:t>
-                      </a:r>
-                    </a:p>
-                  </a:txBody>
-                  <a:tcPr>
-                    <a:solidFill>
-                      <a:schemeClr val="tx1"/>
-                    </a:solidFill>
-                  </a:tcPr>
-                </a:tc>
-                <a:tc>
-                  <a:txBody>
-                    <a:bodyPr/>
-                    <a:lstStyle/>
-                    <a:p>
-                      <a:r>
-                        <a:rPr lang="en-GB" sz="900" b="0" dirty="0">
-                          <a:solidFill>
-                            <a:schemeClr val="bg1"/>
-                          </a:solidFill>
-                        </a:rPr>
-                        <a:t>0.60</a:t>
-                      </a:r>
-                    </a:p>
-                  </a:txBody>
-                  <a:tcPr>
-                    <a:solidFill>
-                      <a:schemeClr val="tx1"/>
-                    </a:solidFill>
-                  </a:tcPr>
-                </a:tc>
-                <a:extLst>
-                  <a:ext uri="{0D108BD9-81ED-4DB2-BD59-A6C34878D82A}">
-                    <a16:rowId xmlns:a16="http://schemas.microsoft.com/office/drawing/2014/main" val="4210157601"/>
-                  </a:ext>
-                </a:extLst>
-              </a:tr>
-              <a:tr h="177507">
-                <a:tc>
-                  <a:txBody>
-                    <a:bodyPr/>
-                    <a:lstStyle/>
-                    <a:p>
-                      <a:r>
-                        <a:rPr lang="en-GB" sz="900" dirty="0"/>
-                        <a:t>…</a:t>
-                      </a:r>
-                    </a:p>
-                  </a:txBody>
-                  <a:tcPr/>
-                </a:tc>
-                <a:tc>
-                  <a:txBody>
-                    <a:bodyPr/>
-                    <a:lstStyle/>
-                    <a:p>
+                      <a:pPr marL="0" marR="0" lvl="0" indent="0" algn="l" defTabSz="1219170" rtl="0" eaLnBrk="1" fontAlgn="auto" latinLnBrk="0" hangingPunct="1">
+                        <a:lnSpc>
+                          <a:spcPct val="100000"/>
+                        </a:lnSpc>
+                        <a:spcBef>
+                          <a:spcPts val="0"/>
+                        </a:spcBef>
+                        <a:spcAft>
+                          <a:spcPts val="0"/>
+                        </a:spcAft>
+                        <a:buClrTx/>
+                        <a:buSzTx/>
+                        <a:buFontTx/>
+                        <a:buNone/>
+                        <a:tabLst/>
+                        <a:defRPr/>
+                      </a:pPr>
                       <a:r>
                         <a:rPr lang="en-GB" sz="900" dirty="0">
                           <a:solidFill>
@@ -20269,6 +20350,162 @@
                     <a:lstStyle/>
                     <a:p>
                       <a:r>
+                        <a:rPr lang="en-GB" sz="900" b="0" dirty="0">
+                          <a:solidFill>
+                            <a:schemeClr val="tx1">
+                              <a:lumMod val="50000"/>
+                            </a:schemeClr>
+                          </a:solidFill>
+                        </a:rPr>
+                        <a:t>/ 33</a:t>
+                      </a:r>
+                    </a:p>
+                  </a:txBody>
+                  <a:tcPr>
+                    <a:solidFill>
+                      <a:schemeClr val="tx1"/>
+                    </a:solidFill>
+                  </a:tcPr>
+                </a:tc>
+                <a:tc>
+                  <a:txBody>
+                    <a:bodyPr/>
+                    <a:lstStyle/>
+                    <a:p>
+                      <a:r>
+                        <a:rPr lang="en-GB" sz="900" b="0" dirty="0">
+                          <a:solidFill>
+                            <a:schemeClr val="bg1"/>
+                          </a:solidFill>
+                        </a:rPr>
+                        <a:t>= 0.01</a:t>
+                      </a:r>
+                    </a:p>
+                  </a:txBody>
+                  <a:tcPr>
+                    <a:solidFill>
+                      <a:schemeClr val="tx1"/>
+                    </a:solidFill>
+                  </a:tcPr>
+                </a:tc>
+                <a:extLst>
+                  <a:ext uri="{0D108BD9-81ED-4DB2-BD59-A6C34878D82A}">
+                    <a16:rowId xmlns:a16="http://schemas.microsoft.com/office/drawing/2014/main" val="1278667350"/>
+                  </a:ext>
+                </a:extLst>
+              </a:tr>
+              <a:tr h="177507">
+                <a:tc>
+                  <a:txBody>
+                    <a:bodyPr/>
+                    <a:lstStyle/>
+                    <a:p>
+                      <a:r>
+                        <a:rPr lang="en-GB" sz="900" dirty="0"/>
+                        <a:t>Gene 3</a:t>
+                      </a:r>
+                    </a:p>
+                  </a:txBody>
+                  <a:tcPr/>
+                </a:tc>
+                <a:tc>
+                  <a:txBody>
+                    <a:bodyPr/>
+                    <a:lstStyle/>
+                    <a:p>
+                      <a:r>
+                        <a:rPr lang="en-GB" sz="900" dirty="0">
+                          <a:solidFill>
+                            <a:schemeClr val="tx1">
+                              <a:lumMod val="50000"/>
+                            </a:schemeClr>
+                          </a:solidFill>
+                        </a:rPr>
+                        <a:t>9</a:t>
+                      </a:r>
+                    </a:p>
+                  </a:txBody>
+                  <a:tcPr>
+                    <a:solidFill>
+                      <a:schemeClr val="tx1"/>
+                    </a:solidFill>
+                  </a:tcPr>
+                </a:tc>
+                <a:tc>
+                  <a:txBody>
+                    <a:bodyPr/>
+                    <a:lstStyle/>
+                    <a:p>
+                      <a:r>
+                        <a:rPr lang="en-GB" sz="900" dirty="0">
+                          <a:solidFill>
+                            <a:schemeClr val="tx1">
+                              <a:lumMod val="50000"/>
+                            </a:schemeClr>
+                          </a:solidFill>
+                        </a:rPr>
+                        <a:t>7</a:t>
+                      </a:r>
+                    </a:p>
+                  </a:txBody>
+                  <a:tcPr>
+                    <a:solidFill>
+                      <a:schemeClr val="tx1"/>
+                    </a:solidFill>
+                  </a:tcPr>
+                </a:tc>
+                <a:tc>
+                  <a:txBody>
+                    <a:bodyPr/>
+                    <a:lstStyle/>
+                    <a:p>
+                      <a:r>
+                        <a:rPr lang="en-GB" sz="900" dirty="0">
+                          <a:solidFill>
+                            <a:schemeClr val="tx1">
+                              <a:lumMod val="50000"/>
+                            </a:schemeClr>
+                          </a:solidFill>
+                        </a:rPr>
+                        <a:t>11</a:t>
+                      </a:r>
+                    </a:p>
+                  </a:txBody>
+                  <a:tcPr>
+                    <a:solidFill>
+                      <a:schemeClr val="tx1"/>
+                    </a:solidFill>
+                  </a:tcPr>
+                </a:tc>
+                <a:tc>
+                  <a:txBody>
+                    <a:bodyPr/>
+                    <a:lstStyle/>
+                    <a:p>
+                      <a:r>
+                        <a:rPr lang="en-GB" sz="900" b="0" dirty="0">
+                          <a:solidFill>
+                            <a:schemeClr val="tx1">
+                              <a:lumMod val="50000"/>
+                            </a:schemeClr>
+                          </a:solidFill>
+                        </a:rPr>
+                        <a:t>9</a:t>
+                      </a:r>
+                    </a:p>
+                  </a:txBody>
+                  <a:tcPr>
+                    <a:solidFill>
+                      <a:schemeClr val="tx1"/>
+                    </a:solidFill>
+                  </a:tcPr>
+                </a:tc>
+                <a:tc>
+                  <a:txBody>
+                    <a:bodyPr/>
+                    <a:lstStyle/>
+                    <a:p>
+                      <a:r>
                         <a:rPr lang="en-GB" sz="900" dirty="0">
                           <a:solidFill>
                             <a:schemeClr val="tx1">
@@ -20278,6 +20515,13 @@
                         </a:rPr>
                         <a:t>…</a:t>
                       </a:r>
+                      <a:endParaRPr lang="en-GB" sz="900" b="0" dirty="0">
+                        <a:solidFill>
+                          <a:schemeClr val="tx1">
+                            <a:lumMod val="50000"/>
+                          </a:schemeClr>
+                        </a:solidFill>
+                      </a:endParaRPr>
                     </a:p>
                   </a:txBody>
                   <a:tcPr>
@@ -20285,6 +20529,70 @@
                       <a:schemeClr val="tx1"/>
                     </a:solidFill>
                   </a:tcPr>
+                </a:tc>
+                <a:tc>
+                  <a:txBody>
+                    <a:bodyPr/>
+                    <a:lstStyle/>
+                    <a:p>
+                      <a:r>
+                        <a:rPr lang="en-GB" sz="900" b="0" dirty="0">
+                          <a:solidFill>
+                            <a:schemeClr val="tx1">
+                              <a:lumMod val="50000"/>
+                            </a:schemeClr>
+                          </a:solidFill>
+                        </a:rPr>
+                        <a:t>/ 10</a:t>
+                      </a:r>
+                    </a:p>
+                  </a:txBody>
+                  <a:tcPr>
+                    <a:solidFill>
+                      <a:schemeClr val="tx1"/>
+                    </a:solidFill>
+                  </a:tcPr>
+                </a:tc>
+                <a:tc>
+                  <a:txBody>
+                    <a:bodyPr/>
+                    <a:lstStyle/>
+                    <a:p>
+                      <a:r>
+                        <a:rPr lang="en-GB" sz="900" b="0" dirty="0">
+                          <a:solidFill>
+                            <a:schemeClr val="bg1"/>
+                          </a:solidFill>
+                        </a:rPr>
+                        <a:t>= 0.90</a:t>
+                      </a:r>
+                    </a:p>
+                  </a:txBody>
+                  <a:tcPr>
+                    <a:solidFill>
+                      <a:schemeClr val="tx1"/>
+                    </a:solidFill>
+                  </a:tcPr>
+                </a:tc>
+                <a:extLst>
+                  <a:ext uri="{0D108BD9-81ED-4DB2-BD59-A6C34878D82A}">
+                    <a16:rowId xmlns:a16="http://schemas.microsoft.com/office/drawing/2014/main" val="4210157601"/>
+                  </a:ext>
+                </a:extLst>
+              </a:tr>
+              <a:tr h="177507">
+                <a:tc>
+                  <a:txBody>
+                    <a:bodyPr/>
+                    <a:lstStyle/>
+                    <a:p>
+                      <a:r>
+                        <a:rPr lang="en-GB" sz="900" dirty="0"/>
+                        <a:t>…</a:t>
+                      </a:r>
+                    </a:p>
+                  </a:txBody>
+                  <a:tcPr/>
                 </a:tc>
                 <a:tc>
                   <a:txBody>
@@ -20315,6 +20623,52 @@
                     <a:lstStyle/>
                     <a:p>
                       <a:r>
+                        <a:rPr lang="en-GB" sz="900" dirty="0">
+                          <a:solidFill>
+                            <a:schemeClr val="tx1">
+                              <a:lumMod val="50000"/>
+                            </a:schemeClr>
+                          </a:solidFill>
+                        </a:rPr>
+                        <a:t>…</a:t>
+                      </a:r>
+                    </a:p>
+                  </a:txBody>
+                  <a:tcPr>
+                    <a:solidFill>
+                      <a:schemeClr val="tx1"/>
+                    </a:solidFill>
+                  </a:tcPr>
+                </a:tc>
+                <a:tc>
+                  <a:txBody>
+                    <a:bodyPr/>
+                    <a:lstStyle/>
+                    <a:p>
+                      <a:r>
+                        <a:rPr lang="en-GB" sz="900" dirty="0">
+                          <a:solidFill>
+                            <a:schemeClr val="tx1">
+                              <a:lumMod val="50000"/>
+                            </a:schemeClr>
+                          </a:solidFill>
+                        </a:rPr>
+                        <a:t>…</a:t>
+                      </a:r>
+                    </a:p>
+                  </a:txBody>
+                  <a:tcPr>
+                    <a:solidFill>
+                      <a:schemeClr val="tx1"/>
+                    </a:solidFill>
+                  </a:tcPr>
+                </a:tc>
+                <a:tc>
+                  <a:txBody>
+                    <a:bodyPr/>
+                    <a:lstStyle/>
+                    <a:p>
+                      <a:r>
                         <a:rPr lang="en-GB" sz="900" b="0" dirty="0">
                           <a:solidFill>
                             <a:schemeClr val="tx1">
@@ -20324,6 +20678,56 @@
                         </a:rPr>
                         <a:t>…</a:t>
                       </a:r>
+                    </a:p>
+                  </a:txBody>
+                  <a:tcPr>
+                    <a:solidFill>
+                      <a:schemeClr val="tx1"/>
+                    </a:solidFill>
+                  </a:tcPr>
+                </a:tc>
+                <a:tc>
+                  <a:txBody>
+                    <a:bodyPr/>
+                    <a:lstStyle/>
+                    <a:p>
+                      <a:r>
+                        <a:rPr lang="en-GB" sz="900" dirty="0">
+                          <a:solidFill>
+                            <a:schemeClr val="tx1">
+                              <a:lumMod val="50000"/>
+                            </a:schemeClr>
+                          </a:solidFill>
+                        </a:rPr>
+                        <a:t>…</a:t>
+                      </a:r>
+                      <a:endParaRPr lang="en-GB" sz="900" b="0" dirty="0">
+                        <a:solidFill>
+                          <a:schemeClr val="tx1">
+                            <a:lumMod val="50000"/>
+                          </a:schemeClr>
+                        </a:solidFill>
+                      </a:endParaRPr>
+                    </a:p>
+                  </a:txBody>
+                  <a:tcPr>
+                    <a:solidFill>
+                      <a:schemeClr val="tx1"/>
+                    </a:solidFill>
+                  </a:tcPr>
+                </a:tc>
+                <a:tc>
+                  <a:txBody>
+                    <a:bodyPr/>
+                    <a:lstStyle/>
+                    <a:p>
+                      <a:endParaRPr lang="en-GB" sz="900" b="0" dirty="0">
+                        <a:solidFill>
+                          <a:schemeClr val="tx1">
+                            <a:lumMod val="50000"/>
+                          </a:schemeClr>
+                        </a:solidFill>
+                      </a:endParaRPr>
                     </a:p>
                   </a:txBody>
                   <a:tcPr>
@@ -20629,8 +21033,8 @@
         </p:nvSpPr>
         <p:spPr>
           <a:xfrm>
-            <a:off x="9183662" y="2486223"/>
-            <a:ext cx="502006" cy="912682"/>
+            <a:off x="9840079" y="2615368"/>
+            <a:ext cx="772186" cy="912682"/>
           </a:xfrm>
           <a:prstGeom prst="rect">
             <a:avLst/>
@@ -20670,7 +21074,7 @@
           <a:lstStyle/>
           <a:p>
             <a:pPr algn="ctr"/>
-            <a:endParaRPr lang="en-GB"/>
+            <a:endParaRPr lang="en-GB" dirty="0"/>
           </a:p>
         </p:txBody>
       </p:sp>
@@ -20685,20 +21089,19 @@
           </p:cNvPr>
           <p:cNvCxnSpPr>
             <a:cxnSpLocks/>
-            <a:stCxn id="58" idx="2"/>
+            <a:stCxn id="53" idx="3"/>
             <a:endCxn id="57" idx="3"/>
           </p:cNvCxnSpPr>
           <p:nvPr/>
         </p:nvCxnSpPr>
         <p:spPr>
-          <a:xfrm rot="16200000" flipH="1">
-            <a:off x="9114494" y="3719075"/>
-            <a:ext cx="1453052" cy="812711"/>
+          <a:xfrm flipH="1">
+            <a:off x="10247376" y="2807187"/>
+            <a:ext cx="364889" cy="2044770"/>
           </a:xfrm>
-          <a:prstGeom prst="bentConnector4">
+          <a:prstGeom prst="bentConnector3">
             <a:avLst>
-              <a:gd name="adj1" fmla="val 10196"/>
-              <a:gd name="adj2" fmla="val 175349"/>
+              <a:gd name="adj1" fmla="val -62649"/>
             </a:avLst>
           </a:prstGeom>
           <a:ln>
@@ -20770,8 +21173,8 @@
         </p:nvSpPr>
         <p:spPr>
           <a:xfrm>
-            <a:off x="6479073" y="1872531"/>
-            <a:ext cx="3463135" cy="222620"/>
+            <a:off x="6479072" y="1872531"/>
+            <a:ext cx="4110843" cy="222620"/>
           </a:xfrm>
           <a:prstGeom prst="roundRect">
             <a:avLst/>

</xml_diff>